<commit_message>
[META] Update powerpoint [frontend] Connect to external api to fetch games data
</commit_message>
<xml_diff>
--- a/Step Forward.pptx
+++ b/Step Forward.pptx
@@ -106,6 +106,11 @@
       </a:defRPr>
     </a:lvl9pPr>
   </p:defaultTextStyle>
+  <p:extLst>
+    <p:ext uri="{EFAFB233-063F-42B5-8137-9DF3F51BA10A}">
+      <p15:sldGuideLst xmlns:p15="http://schemas.microsoft.com/office/powerpoint/2012/main"/>
+    </p:ext>
+  </p:extLst>
 </p:presentation>
 </file>
 
@@ -5546,13 +5551,13 @@
         </p:nvSpPr>
         <p:spPr>
           <a:xfrm>
-            <a:off x="1205802" y="1261872"/>
-            <a:ext cx="5364815" cy="2852928"/>
+            <a:off x="773723" y="277134"/>
+            <a:ext cx="7475974" cy="1189926"/>
           </a:xfrm>
         </p:spPr>
         <p:txBody>
           <a:bodyPr vert="horz" lIns="91440" tIns="45720" rIns="91440" bIns="45720" rtlCol="0" anchor="b">
-            <a:normAutofit/>
+            <a:normAutofit fontScale="90000"/>
           </a:bodyPr>
           <a:lstStyle/>
           <a:p>
@@ -5732,10 +5737,10 @@
       </p:grpSp>
       <p:pic>
         <p:nvPicPr>
-          <p:cNvPr id="1028" name="Picture 4" descr="PlantUML diagram">
-            <a:extLst>
-              <a:ext uri="{FF2B5EF4-FFF2-40B4-BE49-F238E27FC236}">
-                <a16:creationId xmlns:a16="http://schemas.microsoft.com/office/drawing/2014/main" id="{7505D7D8-8780-334A-2606-2AEC9C566A69}"/>
+          <p:cNvPr id="3" name="Picture 4" descr="PlantUML diagram">
+            <a:extLst>
+              <a:ext uri="{FF2B5EF4-FFF2-40B4-BE49-F238E27FC236}">
+                <a16:creationId xmlns:a16="http://schemas.microsoft.com/office/drawing/2014/main" id="{52CA9AE4-B5C9-2ED5-C1E6-D76FAE544737}"/>
               </a:ext>
             </a:extLst>
           </p:cNvPr>
@@ -5759,8 +5764,8 @@
         </p:blipFill>
         <p:spPr bwMode="auto">
           <a:xfrm>
-            <a:off x="7110870" y="0"/>
-            <a:ext cx="3595687" cy="6858000"/>
+            <a:off x="0" y="2135188"/>
+            <a:ext cx="12192000" cy="3552179"/>
           </a:xfrm>
           <a:prstGeom prst="rect">
             <a:avLst/>
@@ -5775,6 +5780,36 @@
               </a14:hiddenFill>
             </a:ext>
           </a:extLst>
+        </p:spPr>
+      </p:pic>
+      <p:pic>
+        <p:nvPicPr>
+          <p:cNvPr id="4" name="Picture 3" descr="A close up of a logo&#10;&#10;AI-generated content may be incorrect.">
+            <a:extLst>
+              <a:ext uri="{FF2B5EF4-FFF2-40B4-BE49-F238E27FC236}">
+                <a16:creationId xmlns:a16="http://schemas.microsoft.com/office/drawing/2014/main" id="{CD8DB4D8-6E91-72C6-9BB0-E33BBC05FE28}"/>
+              </a:ext>
+            </a:extLst>
+          </p:cNvPr>
+          <p:cNvPicPr>
+            <a:picLocks noChangeAspect="1"/>
+          </p:cNvPicPr>
+          <p:nvPr/>
+        </p:nvPicPr>
+        <p:blipFill>
+          <a:blip r:embed="rId5"/>
+          <a:stretch>
+            <a:fillRect/>
+          </a:stretch>
+        </p:blipFill>
+        <p:spPr>
+          <a:xfrm>
+            <a:off x="6389617" y="5326250"/>
+            <a:ext cx="4422123" cy="740705"/>
+          </a:xfrm>
+          <a:prstGeom prst="rect">
+            <a:avLst/>
+          </a:prstGeom>
         </p:spPr>
       </p:pic>
     </p:spTree>
@@ -5854,12 +5889,20 @@
         </p:nvSpPr>
         <p:spPr/>
         <p:txBody>
-          <a:bodyPr/>
+          <a:bodyPr>
+            <a:normAutofit lnSpcReduction="10000"/>
+          </a:bodyPr>
           <a:lstStyle/>
           <a:p>
             <a:r>
               <a:rPr lang="en-US" dirty="0"/>
               <a:t>GITHUB [https://github.com/whyt1/stepforward]</a:t>
+            </a:r>
+          </a:p>
+          <a:p>
+            <a:r>
+              <a:rPr lang="en-US" dirty="0"/>
+              <a:t>FIGMA [https://www.figma.com/design/FP5IugcBdVPVLrWFIf2dFD/Untitled?node-id=0-1&amp;t=E2AaZSHzbbp9n3o2-1]</a:t>
             </a:r>
           </a:p>
           <a:p>
@@ -5912,13 +5955,43 @@
           <a:p>
             <a:pPr lvl="2"/>
             <a:r>
-              <a:rPr lang="en-US"/>
+              <a:rPr lang="en-US" dirty="0"/>
               <a:t>123456   </a:t>
             </a:r>
             <a:endParaRPr lang="en-IL" dirty="0"/>
           </a:p>
         </p:txBody>
       </p:sp>
+      <p:pic>
+        <p:nvPicPr>
+          <p:cNvPr id="4" name="Picture 3" descr="A close up of a logo&#10;&#10;AI-generated content may be incorrect.">
+            <a:extLst>
+              <a:ext uri="{FF2B5EF4-FFF2-40B4-BE49-F238E27FC236}">
+                <a16:creationId xmlns:a16="http://schemas.microsoft.com/office/drawing/2014/main" id="{25EEA074-46E0-C93F-C823-DD829AD2EF91}"/>
+              </a:ext>
+            </a:extLst>
+          </p:cNvPr>
+          <p:cNvPicPr>
+            <a:picLocks noChangeAspect="1"/>
+          </p:cNvPicPr>
+          <p:nvPr/>
+        </p:nvPicPr>
+        <p:blipFill>
+          <a:blip r:embed="rId4"/>
+          <a:stretch>
+            <a:fillRect/>
+          </a:stretch>
+        </p:blipFill>
+        <p:spPr>
+          <a:xfrm>
+            <a:off x="6342858" y="5609119"/>
+            <a:ext cx="4422123" cy="740705"/>
+          </a:xfrm>
+          <a:prstGeom prst="rect">
+            <a:avLst/>
+          </a:prstGeom>
+        </p:spPr>
+      </p:pic>
     </p:spTree>
     <p:extLst>
       <p:ext uri="{BB962C8B-B14F-4D97-AF65-F5344CB8AC3E}">

</xml_diff>